<commit_message>
Updated slides and readme
</commit_message>
<xml_diff>
--- a/ReactiveUI.pptx
+++ b/ReactiveUI.pptx
@@ -5,7 +5,7 @@
     <p:sldMasterId id="2147483648" r:id="rId1"/>
   </p:sldMasterIdLst>
   <p:notesMasterIdLst>
-    <p:notesMasterId r:id="rId14"/>
+    <p:notesMasterId r:id="rId15"/>
   </p:notesMasterIdLst>
   <p:sldIdLst>
     <p:sldId id="256" r:id="rId2"/>
@@ -17,9 +17,10 @@
     <p:sldId id="400" r:id="rId8"/>
     <p:sldId id="401" r:id="rId9"/>
     <p:sldId id="399" r:id="rId10"/>
-    <p:sldId id="396" r:id="rId11"/>
-    <p:sldId id="284" r:id="rId12"/>
-    <p:sldId id="380" r:id="rId13"/>
+    <p:sldId id="402" r:id="rId11"/>
+    <p:sldId id="396" r:id="rId12"/>
+    <p:sldId id="284" r:id="rId13"/>
+    <p:sldId id="380" r:id="rId14"/>
   </p:sldIdLst>
   <p:sldSz cx="9144000" cy="5143500" type="screen16x9"/>
   <p:notesSz cx="6858000" cy="9144000"/>
@@ -203,7 +204,7 @@
           <a:p>
             <a:fld id="{3CA109D5-1713-4BDD-95D4-4F2746346678}" type="datetimeFigureOut">
               <a:rPr lang="en-US" smtClean="0"/>
-              <a:t>9/22/2012</a:t>
+              <a:t>9/23/2012</a:t>
             </a:fld>
             <a:endParaRPr lang="en-US"/>
           </a:p>
@@ -821,6 +822,90 @@
         </p:nvSpPr>
         <p:spPr/>
         <p:txBody>
+          <a:bodyPr/>
+          <a:lstStyle/>
+          <a:p>
+            <a:endParaRPr lang="en-US" dirty="0"/>
+          </a:p>
+        </p:txBody>
+      </p:sp>
+      <p:sp>
+        <p:nvSpPr>
+          <p:cNvPr id="4" name="Slide Number Placeholder 3"/>
+          <p:cNvSpPr>
+            <a:spLocks noGrp="1"/>
+          </p:cNvSpPr>
+          <p:nvPr>
+            <p:ph type="sldNum" sz="quarter" idx="10"/>
+          </p:nvPr>
+        </p:nvSpPr>
+        <p:spPr/>
+        <p:txBody>
+          <a:bodyPr/>
+          <a:lstStyle/>
+          <a:p>
+            <a:fld id="{23CA0AAC-424A-4693-9173-3ED2E9BFC70A}" type="slidenum">
+              <a:rPr lang="en-US" smtClean="0"/>
+              <a:t>6</a:t>
+            </a:fld>
+            <a:endParaRPr lang="en-US"/>
+          </a:p>
+        </p:txBody>
+      </p:sp>
+    </p:spTree>
+    <p:extLst>
+      <p:ext uri="{BB962C8B-B14F-4D97-AF65-F5344CB8AC3E}">
+        <p14:creationId xmlns:p14="http://schemas.microsoft.com/office/powerpoint/2010/main" val="678973724"/>
+      </p:ext>
+    </p:extLst>
+  </p:cSld>
+  <p:clrMapOvr>
+    <a:masterClrMapping/>
+  </p:clrMapOvr>
+</p:notes>
+</file>
+
+<file path=ppt/notesSlides/notesSlide4.xml><?xml version="1.0" encoding="utf-8"?>
+<p:notes xmlns:a="http://schemas.openxmlformats.org/drawingml/2006/main" xmlns:r="http://schemas.openxmlformats.org/officeDocument/2006/relationships" xmlns:p="http://schemas.openxmlformats.org/presentationml/2006/main">
+  <p:cSld>
+    <p:spTree>
+      <p:nvGrpSpPr>
+        <p:cNvPr id="1" name=""/>
+        <p:cNvGrpSpPr/>
+        <p:nvPr/>
+      </p:nvGrpSpPr>
+      <p:grpSpPr>
+        <a:xfrm>
+          <a:off x="0" y="0"/>
+          <a:ext cx="0" cy="0"/>
+          <a:chOff x="0" y="0"/>
+          <a:chExt cx="0" cy="0"/>
+        </a:xfrm>
+      </p:grpSpPr>
+      <p:sp>
+        <p:nvSpPr>
+          <p:cNvPr id="2" name="Slide Image Placeholder 1"/>
+          <p:cNvSpPr>
+            <a:spLocks noGrp="1" noRot="1" noChangeAspect="1"/>
+          </p:cNvSpPr>
+          <p:nvPr>
+            <p:ph type="sldImg"/>
+          </p:nvPr>
+        </p:nvSpPr>
+        <p:spPr/>
+      </p:sp>
+      <p:sp>
+        <p:nvSpPr>
+          <p:cNvPr id="3" name="Notes Placeholder 2"/>
+          <p:cNvSpPr>
+            <a:spLocks noGrp="1"/>
+          </p:cNvSpPr>
+          <p:nvPr>
+            <p:ph type="body" idx="1"/>
+          </p:nvPr>
+        </p:nvSpPr>
+        <p:spPr/>
+        <p:txBody>
           <a:bodyPr>
             <a:normAutofit/>
           </a:bodyPr>
@@ -1160,7 +1245,7 @@
 </p:notes>
 </file>
 
-<file path=ppt/notesSlides/notesSlide4.xml><?xml version="1.0" encoding="utf-8"?>
+<file path=ppt/notesSlides/notesSlide5.xml><?xml version="1.0" encoding="utf-8"?>
 <p:notes xmlns:a="http://schemas.openxmlformats.org/drawingml/2006/main" xmlns:r="http://schemas.openxmlformats.org/officeDocument/2006/relationships" xmlns:p="http://schemas.openxmlformats.org/presentationml/2006/main">
   <p:cSld>
     <p:spTree>
@@ -1797,7 +1882,7 @@
           <a:p>
             <a:fld id="{0A880653-9441-4767-9466-80716C7EC927}" type="datetime1">
               <a:rPr lang="en-US" smtClean="0"/>
-              <a:t>9/22/2012</a:t>
+              <a:t>9/23/2012</a:t>
             </a:fld>
             <a:endParaRPr lang="en-US"/>
           </a:p>
@@ -1907,7 +1992,7 @@
           <a:p>
             <a:fld id="{3F57A1CF-15FA-40AB-AFF1-F208A14876BB}" type="datetime1">
               <a:rPr lang="en-US" smtClean="0"/>
-              <a:t>9/22/2012</a:t>
+              <a:t>9/23/2012</a:t>
             </a:fld>
             <a:endParaRPr lang="en-US" dirty="0"/>
           </a:p>
@@ -2199,7 +2284,7 @@
           <a:p>
             <a:fld id="{A0738917-D33C-47BE-A929-F38D10742F8B}" type="datetime1">
               <a:rPr lang="en-US" smtClean="0"/>
-              <a:t>9/22/2012</a:t>
+              <a:t>9/23/2012</a:t>
             </a:fld>
             <a:endParaRPr lang="en-US" dirty="0"/>
           </a:p>
@@ -2480,7 +2565,7 @@
           <a:p>
             <a:fld id="{1C2F7547-008D-40AF-9C28-1CDAACA7BE7C}" type="datetime1">
               <a:rPr lang="en-US" smtClean="0"/>
-              <a:t>9/22/2012</a:t>
+              <a:t>9/23/2012</a:t>
             </a:fld>
             <a:endParaRPr lang="en-US"/>
           </a:p>
@@ -2741,7 +2826,7 @@
           <a:p>
             <a:fld id="{40BBCE36-1B9A-4EA7-9C60-B496C2B32C03}" type="datetime1">
               <a:rPr lang="en-US" smtClean="0"/>
-              <a:t>9/22/2012</a:t>
+              <a:t>9/23/2012</a:t>
             </a:fld>
             <a:endParaRPr lang="en-US"/>
           </a:p>
@@ -2915,7 +3000,7 @@
           <a:p>
             <a:fld id="{30065C4B-38D8-4C64-B376-F40DEDAAD094}" type="datetime1">
               <a:rPr lang="en-US" smtClean="0"/>
-              <a:t>9/22/2012</a:t>
+              <a:t>9/23/2012</a:t>
             </a:fld>
             <a:endParaRPr lang="en-US"/>
           </a:p>
@@ -3099,7 +3184,7 @@
           <a:p>
             <a:fld id="{BF45B3EB-B3F5-479F-9470-49CF1F9B1588}" type="datetime1">
               <a:rPr lang="en-US" smtClean="0"/>
-              <a:t>9/22/2012</a:t>
+              <a:t>9/23/2012</a:t>
             </a:fld>
             <a:endParaRPr lang="en-US"/>
           </a:p>
@@ -3540,7 +3625,7 @@
           <a:p>
             <a:fld id="{6BBEF542-37A5-482E-858C-2D9A49DDF7D4}" type="datetime1">
               <a:rPr lang="en-US" smtClean="0"/>
-              <a:t>9/22/2012</a:t>
+              <a:t>9/23/2012</a:t>
             </a:fld>
             <a:endParaRPr lang="en-US" dirty="0"/>
           </a:p>
@@ -3797,7 +3882,7 @@
           <a:p>
             <a:fld id="{74A9E0C6-3F21-411F-B50F-14050BCF6637}" type="datetime1">
               <a:rPr lang="en-US" smtClean="0"/>
-              <a:t>9/22/2012</a:t>
+              <a:t>9/23/2012</a:t>
             </a:fld>
             <a:endParaRPr lang="en-US"/>
           </a:p>
@@ -4089,7 +4174,7 @@
           <a:p>
             <a:fld id="{3F3EBFD9-D4EE-4A00-8B6E-245F23BF054B}" type="datetime1">
               <a:rPr lang="en-US" smtClean="0"/>
-              <a:t>9/22/2012</a:t>
+              <a:t>9/23/2012</a:t>
             </a:fld>
             <a:endParaRPr lang="en-US"/>
           </a:p>
@@ -4515,7 +4600,7 @@
           <a:p>
             <a:fld id="{F5D15955-7E60-427B-8986-99D10B1CE469}" type="datetime1">
               <a:rPr lang="en-US" smtClean="0"/>
-              <a:t>9/22/2012</a:t>
+              <a:t>9/23/2012</a:t>
             </a:fld>
             <a:endParaRPr lang="en-US"/>
           </a:p>
@@ -4637,7 +4722,7 @@
           <a:p>
             <a:fld id="{8DEACE19-28F8-4344-A929-AF0D5D7D086C}" type="datetime1">
               <a:rPr lang="en-US" smtClean="0"/>
-              <a:t>9/22/2012</a:t>
+              <a:t>9/23/2012</a:t>
             </a:fld>
             <a:endParaRPr lang="en-US"/>
           </a:p>
@@ -4736,7 +4821,7 @@
           <a:p>
             <a:fld id="{7E615E74-3780-4DF9-A5BE-A684F61D6D97}" type="datetime1">
               <a:rPr lang="en-US" smtClean="0"/>
-              <a:t>9/22/2012</a:t>
+              <a:t>9/23/2012</a:t>
             </a:fld>
             <a:endParaRPr lang="en-US"/>
           </a:p>
@@ -4877,7 +4962,7 @@
           <a:p>
             <a:fld id="{AC3A2D63-9E8A-4514-A9E4-4CF5DEA2B905}" type="datetime1">
               <a:rPr lang="en-US" smtClean="0"/>
-              <a:t>9/22/2012</a:t>
+              <a:t>9/23/2012</a:t>
             </a:fld>
             <a:endParaRPr lang="en-US" dirty="0"/>
           </a:p>
@@ -5140,7 +5225,7 @@
           <a:p>
             <a:fld id="{DE547815-63B8-4BB7-9F63-1FE40FCAE19C}" type="datetime1">
               <a:rPr lang="en-US" smtClean="0"/>
-              <a:t>9/22/2012</a:t>
+              <a:t>9/23/2012</a:t>
             </a:fld>
             <a:endParaRPr lang="en-US" dirty="0"/>
           </a:p>
@@ -5544,7 +5629,7 @@
           <a:p>
             <a:fld id="{60D5585E-8056-47F9-87AF-79070194E2FE}" type="datetime1">
               <a:rPr lang="en-US" smtClean="0"/>
-              <a:t>9/22/2012</a:t>
+              <a:t>9/23/2012</a:t>
             </a:fld>
             <a:endParaRPr lang="en-US" dirty="0"/>
           </a:p>
@@ -6013,29 +6098,6 @@
       </p:sp>
       <p:sp>
         <p:nvSpPr>
-          <p:cNvPr id="4" name="Footer Placeholder 3"/>
-          <p:cNvSpPr>
-            <a:spLocks noGrp="1"/>
-          </p:cNvSpPr>
-          <p:nvPr>
-            <p:ph type="ftr" sz="quarter" idx="11"/>
-          </p:nvPr>
-        </p:nvSpPr>
-        <p:spPr/>
-        <p:txBody>
-          <a:bodyPr/>
-          <a:lstStyle/>
-          <a:p>
-            <a:r>
-              <a:rPr lang="en-US" smtClean="0"/>
-              <a:t>MVVM All around</a:t>
-            </a:r>
-            <a:endParaRPr lang="en-US" dirty="0"/>
-          </a:p>
-        </p:txBody>
-      </p:sp>
-      <p:sp>
-        <p:nvSpPr>
           <p:cNvPr id="5" name="Slide Number Placeholder 4"/>
           <p:cNvSpPr>
             <a:spLocks noGrp="1"/>
@@ -6256,7 +6318,7 @@
 </file>
 
 <file path=ppt/slides/slide10.xml><?xml version="1.0" encoding="utf-8"?>
-<p:sld xmlns:a="http://schemas.openxmlformats.org/drawingml/2006/main" xmlns:r="http://schemas.openxmlformats.org/officeDocument/2006/relationships" xmlns:p="http://schemas.openxmlformats.org/presentationml/2006/main" show="0">
+<p:sld xmlns:a="http://schemas.openxmlformats.org/drawingml/2006/main" xmlns:r="http://schemas.openxmlformats.org/officeDocument/2006/relationships" xmlns:p="http://schemas.openxmlformats.org/presentationml/2006/main">
   <p:cSld>
     <p:spTree>
       <p:nvGrpSpPr>
@@ -6291,7 +6353,15 @@
           <a:p>
             <a:r>
               <a:rPr lang="en-US" dirty="0" smtClean="0"/>
-              <a:t>Summary</a:t>
+              <a:t>Where is the </a:t>
+            </a:r>
+            <a:r>
+              <a:rPr lang="en-US" dirty="0" err="1" smtClean="0"/>
+              <a:t>Codez</a:t>
+            </a:r>
+            <a:r>
+              <a:rPr lang="en-US" dirty="0" smtClean="0"/>
+              <a:t>?</a:t>
             </a:r>
             <a:endParaRPr lang="en-US" dirty="0"/>
           </a:p>
@@ -6312,28 +6382,83 @@
           <a:bodyPr/>
           <a:lstStyle/>
           <a:p>
+            <a:r>
+              <a:rPr lang="en-US" dirty="0" smtClean="0"/>
+              <a:t>This Session</a:t>
+            </a:r>
+          </a:p>
+          <a:p>
+            <a:pPr lvl="1"/>
+            <a:r>
+              <a:rPr lang="en-US" dirty="0" smtClean="0">
+                <a:hlinkClick r:id="rId2"/>
+              </a:rPr>
+              <a:t>https</a:t>
+            </a:r>
+            <a:r>
+              <a:rPr lang="en-US" dirty="0">
+                <a:hlinkClick r:id="rId2"/>
+              </a:rPr>
+              <a:t>://github.com/arielbh/ReactiveUI-Intro</a:t>
+            </a:r>
+            <a:endParaRPr lang="en-US" dirty="0" smtClean="0"/>
+          </a:p>
+          <a:p>
+            <a:r>
+              <a:rPr lang="en-US" dirty="0" err="1" smtClean="0"/>
+              <a:t>ReactiveUI</a:t>
+            </a:r>
             <a:endParaRPr lang="en-US" dirty="0"/>
           </a:p>
-        </p:txBody>
-      </p:sp>
-      <p:sp>
-        <p:nvSpPr>
-          <p:cNvPr id="4" name="Footer Placeholder 3"/>
-          <p:cNvSpPr>
-            <a:spLocks noGrp="1"/>
-          </p:cNvSpPr>
-          <p:nvPr>
-            <p:ph type="ftr" sz="quarter" idx="11"/>
-          </p:nvPr>
-        </p:nvSpPr>
-        <p:spPr/>
-        <p:txBody>
-          <a:bodyPr/>
-          <a:lstStyle/>
-          <a:p>
-            <a:r>
-              <a:rPr lang="en-US" smtClean="0"/>
-              <a:t>MVVM All around</a:t>
+          <a:p>
+            <a:pPr lvl="1"/>
+            <a:r>
+              <a:rPr lang="en-US" dirty="0" smtClean="0">
+                <a:hlinkClick r:id="rId3"/>
+              </a:rPr>
+              <a:t>https</a:t>
+            </a:r>
+            <a:r>
+              <a:rPr lang="en-US" dirty="0">
+                <a:hlinkClick r:id="rId3"/>
+              </a:rPr>
+              <a:t>://github.com/reactiveui/ReactiveUI</a:t>
+            </a:r>
+            <a:endParaRPr lang="en-US" dirty="0">
+              <a:hlinkClick r:id="rId4"/>
+            </a:endParaRPr>
+          </a:p>
+          <a:p>
+            <a:r>
+              <a:rPr lang="en-US" dirty="0" err="1" smtClean="0"/>
+              <a:t>ReactiveUI</a:t>
+            </a:r>
+            <a:r>
+              <a:rPr lang="en-US" dirty="0" smtClean="0"/>
+              <a:t> Samples</a:t>
+            </a:r>
+            <a:r>
+              <a:rPr lang="he-IL" dirty="0" smtClean="0"/>
+              <a:t> </a:t>
+            </a:r>
+            <a:r>
+              <a:rPr lang="en-US" dirty="0" smtClean="0"/>
+              <a:t> (I accept Pull Request!)</a:t>
+            </a:r>
+          </a:p>
+          <a:p>
+            <a:pPr lvl="1"/>
+            <a:r>
+              <a:rPr lang="en-US" dirty="0" smtClean="0">
+                <a:hlinkClick r:id="rId4"/>
+              </a:rPr>
+              <a:t>https</a:t>
+            </a:r>
+            <a:r>
+              <a:rPr lang="en-US" dirty="0">
+                <a:hlinkClick r:id="rId4"/>
+              </a:rPr>
+              <a:t>://github.com/reactiveui/ReactiveUI.Samples</a:t>
             </a:r>
             <a:endParaRPr lang="en-US" dirty="0"/>
           </a:p>
@@ -6365,21 +6490,13 @@
     </p:spTree>
     <p:extLst>
       <p:ext uri="{BB962C8B-B14F-4D97-AF65-F5344CB8AC3E}">
-        <p14:creationId xmlns:p14="http://schemas.microsoft.com/office/powerpoint/2010/main" val="1448685216"/>
+        <p14:creationId xmlns:p14="http://schemas.microsoft.com/office/powerpoint/2010/main" val="1720331797"/>
       </p:ext>
     </p:extLst>
   </p:cSld>
   <p:clrMapOvr>
     <a:masterClrMapping/>
   </p:clrMapOvr>
-  <mc:AlternateContent xmlns:mc="http://schemas.openxmlformats.org/markup-compatibility/2006">
-    <mc:Choice xmlns:p14="http://schemas.microsoft.com/office/powerpoint/2010/main" Requires="p14">
-      <p:transition spd="slow" p14:dur="2000"/>
-    </mc:Choice>
-    <mc:Fallback>
-      <p:transition spd="slow"/>
-    </mc:Fallback>
-  </mc:AlternateContent>
   <p:timing>
     <p:tnLst>
       <p:par>
@@ -6420,13 +6537,13 @@
         <p:spPr/>
         <p:txBody>
           <a:bodyPr>
-            <a:normAutofit/>
+            <a:normAutofit fontScale="90000"/>
           </a:bodyPr>
           <a:lstStyle/>
           <a:p>
             <a:r>
               <a:rPr lang="en-US" dirty="0" smtClean="0"/>
-              <a:t>Q &amp; A</a:t>
+              <a:t>Summary</a:t>
             </a:r>
             <a:endParaRPr lang="en-US" dirty="0"/>
           </a:p>
@@ -6434,6 +6551,48 @@
       </p:sp>
       <p:sp>
         <p:nvSpPr>
+          <p:cNvPr id="3" name="Content Placeholder 2"/>
+          <p:cNvSpPr>
+            <a:spLocks noGrp="1"/>
+          </p:cNvSpPr>
+          <p:nvPr>
+            <p:ph idx="1"/>
+          </p:nvPr>
+        </p:nvSpPr>
+        <p:spPr/>
+        <p:txBody>
+          <a:bodyPr/>
+          <a:lstStyle/>
+          <a:p>
+            <a:endParaRPr lang="en-US" dirty="0"/>
+          </a:p>
+        </p:txBody>
+      </p:sp>
+      <p:sp>
+        <p:nvSpPr>
+          <p:cNvPr id="4" name="Footer Placeholder 3"/>
+          <p:cNvSpPr>
+            <a:spLocks noGrp="1"/>
+          </p:cNvSpPr>
+          <p:nvPr>
+            <p:ph type="ftr" sz="quarter" idx="11"/>
+          </p:nvPr>
+        </p:nvSpPr>
+        <p:spPr/>
+        <p:txBody>
+          <a:bodyPr/>
+          <a:lstStyle/>
+          <a:p>
+            <a:r>
+              <a:rPr lang="en-US" smtClean="0"/>
+              <a:t>MVVM All around</a:t>
+            </a:r>
+            <a:endParaRPr lang="en-US" dirty="0"/>
+          </a:p>
+        </p:txBody>
+      </p:sp>
+      <p:sp>
+        <p:nvSpPr>
           <p:cNvPr id="5" name="Slide Number Placeholder 4"/>
           <p:cNvSpPr>
             <a:spLocks noGrp="1"/>
@@ -6447,7 +6606,7 @@
           <a:bodyPr/>
           <a:lstStyle/>
           <a:p>
-            <a:fld id="{A7A032D9-EB8E-4A25-9E6B-7427C3BBF13B}" type="slidenum">
+            <a:fld id="{AA986F54-24DE-4AB4-95BF-72E7F2EFFBC6}" type="slidenum">
               <a:rPr lang="en-US" smtClean="0"/>
               <a:t>11</a:t>
             </a:fld>
@@ -6455,87 +6614,21 @@
           </a:p>
         </p:txBody>
       </p:sp>
-      <p:sp>
-        <p:nvSpPr>
-          <p:cNvPr id="3" name="Text Placeholder 2"/>
-          <p:cNvSpPr>
-            <a:spLocks noGrp="1"/>
-          </p:cNvSpPr>
-          <p:nvPr>
-            <p:ph type="body" idx="1"/>
-          </p:nvPr>
-        </p:nvSpPr>
-        <p:spPr/>
-        <p:txBody>
-          <a:bodyPr/>
-          <a:lstStyle/>
-          <a:p>
-            <a:endParaRPr lang="en-US"/>
-          </a:p>
-        </p:txBody>
-      </p:sp>
-      <p:sp>
-        <p:nvSpPr>
-          <p:cNvPr id="8" name="Content Placeholder 7"/>
-          <p:cNvSpPr>
-            <a:spLocks noGrp="1"/>
-          </p:cNvSpPr>
-          <p:nvPr>
-            <p:ph sz="half" idx="2"/>
-          </p:nvPr>
-        </p:nvSpPr>
-        <p:spPr/>
-        <p:txBody>
-          <a:bodyPr/>
-          <a:lstStyle/>
-          <a:p>
-            <a:endParaRPr lang="en-US"/>
-          </a:p>
-        </p:txBody>
-      </p:sp>
-      <p:sp>
-        <p:nvSpPr>
-          <p:cNvPr id="9" name="Footer Placeholder 3"/>
-          <p:cNvSpPr>
-            <a:spLocks noGrp="1"/>
-          </p:cNvSpPr>
-          <p:nvPr>
-            <p:ph type="ftr" sz="quarter" idx="11"/>
-          </p:nvPr>
-        </p:nvSpPr>
-        <p:spPr>
-          <a:xfrm>
-            <a:off x="3124200" y="4767263"/>
-            <a:ext cx="2895600" cy="273844"/>
-          </a:xfrm>
-        </p:spPr>
-        <p:txBody>
-          <a:bodyPr/>
-          <a:lstStyle/>
-          <a:p>
-            <a:r>
-              <a:rPr lang="en-US" smtClean="0"/>
-              <a:t>MVVM All around</a:t>
-            </a:r>
-            <a:endParaRPr lang="en-US" dirty="0"/>
-          </a:p>
-        </p:txBody>
-      </p:sp>
     </p:spTree>
     <p:extLst>
       <p:ext uri="{BB962C8B-B14F-4D97-AF65-F5344CB8AC3E}">
-        <p14:creationId xmlns:p14="http://schemas.microsoft.com/office/powerpoint/2010/main" val="3009958123"/>
+        <p14:creationId xmlns:p14="http://schemas.microsoft.com/office/powerpoint/2010/main" val="1448685216"/>
       </p:ext>
     </p:extLst>
   </p:cSld>
   <p:clrMapOvr>
     <a:masterClrMapping/>
   </p:clrMapOvr>
-  <mc:AlternateContent xmlns:mc="http://schemas.openxmlformats.org/markup-compatibility/2006">
-    <mc:Choice xmlns:p14="http://schemas.microsoft.com/office/powerpoint/2010/main" Requires="p14">
+  <mc:AlternateContent xmlns:mc="http://schemas.openxmlformats.org/markup-compatibility/2006" xmlns:p14="http://schemas.microsoft.com/office/powerpoint/2010/main">
+    <mc:Choice Requires="p14">
       <p:transition spd="slow" p14:dur="2000"/>
     </mc:Choice>
-    <mc:Fallback>
+    <mc:Fallback xmlns="">
       <p:transition spd="slow"/>
     </mc:Fallback>
   </mc:AlternateContent>
@@ -6568,6 +6661,165 @@
       </p:grpSpPr>
       <p:sp>
         <p:nvSpPr>
+          <p:cNvPr id="2" name="Title 1"/>
+          <p:cNvSpPr>
+            <a:spLocks noGrp="1"/>
+          </p:cNvSpPr>
+          <p:nvPr>
+            <p:ph type="title"/>
+          </p:nvPr>
+        </p:nvSpPr>
+        <p:spPr/>
+        <p:txBody>
+          <a:bodyPr>
+            <a:normAutofit/>
+          </a:bodyPr>
+          <a:lstStyle/>
+          <a:p>
+            <a:r>
+              <a:rPr lang="en-US" dirty="0" smtClean="0"/>
+              <a:t>Q &amp; A</a:t>
+            </a:r>
+            <a:endParaRPr lang="en-US" dirty="0"/>
+          </a:p>
+        </p:txBody>
+      </p:sp>
+      <p:sp>
+        <p:nvSpPr>
+          <p:cNvPr id="5" name="Slide Number Placeholder 4"/>
+          <p:cNvSpPr>
+            <a:spLocks noGrp="1"/>
+          </p:cNvSpPr>
+          <p:nvPr>
+            <p:ph type="sldNum" sz="quarter" idx="12"/>
+          </p:nvPr>
+        </p:nvSpPr>
+        <p:spPr/>
+        <p:txBody>
+          <a:bodyPr/>
+          <a:lstStyle/>
+          <a:p>
+            <a:fld id="{A7A032D9-EB8E-4A25-9E6B-7427C3BBF13B}" type="slidenum">
+              <a:rPr lang="en-US" smtClean="0"/>
+              <a:t>12</a:t>
+            </a:fld>
+            <a:endParaRPr lang="en-US"/>
+          </a:p>
+        </p:txBody>
+      </p:sp>
+      <p:sp>
+        <p:nvSpPr>
+          <p:cNvPr id="3" name="Text Placeholder 2"/>
+          <p:cNvSpPr>
+            <a:spLocks noGrp="1"/>
+          </p:cNvSpPr>
+          <p:nvPr>
+            <p:ph type="body" idx="1"/>
+          </p:nvPr>
+        </p:nvSpPr>
+        <p:spPr/>
+        <p:txBody>
+          <a:bodyPr/>
+          <a:lstStyle/>
+          <a:p>
+            <a:endParaRPr lang="en-US"/>
+          </a:p>
+        </p:txBody>
+      </p:sp>
+      <p:sp>
+        <p:nvSpPr>
+          <p:cNvPr id="8" name="Content Placeholder 7"/>
+          <p:cNvSpPr>
+            <a:spLocks noGrp="1"/>
+          </p:cNvSpPr>
+          <p:nvPr>
+            <p:ph sz="half" idx="2"/>
+          </p:nvPr>
+        </p:nvSpPr>
+        <p:spPr/>
+        <p:txBody>
+          <a:bodyPr/>
+          <a:lstStyle/>
+          <a:p>
+            <a:endParaRPr lang="en-US"/>
+          </a:p>
+        </p:txBody>
+      </p:sp>
+      <p:sp>
+        <p:nvSpPr>
+          <p:cNvPr id="9" name="Footer Placeholder 3"/>
+          <p:cNvSpPr>
+            <a:spLocks noGrp="1"/>
+          </p:cNvSpPr>
+          <p:nvPr>
+            <p:ph type="ftr" sz="quarter" idx="11"/>
+          </p:nvPr>
+        </p:nvSpPr>
+        <p:spPr>
+          <a:xfrm>
+            <a:off x="3124200" y="4767263"/>
+            <a:ext cx="2895600" cy="273844"/>
+          </a:xfrm>
+        </p:spPr>
+        <p:txBody>
+          <a:bodyPr/>
+          <a:lstStyle/>
+          <a:p>
+            <a:r>
+              <a:rPr lang="en-US" smtClean="0"/>
+              <a:t>MVVM All around</a:t>
+            </a:r>
+            <a:endParaRPr lang="en-US" dirty="0"/>
+          </a:p>
+        </p:txBody>
+      </p:sp>
+    </p:spTree>
+    <p:extLst>
+      <p:ext uri="{BB962C8B-B14F-4D97-AF65-F5344CB8AC3E}">
+        <p14:creationId xmlns:p14="http://schemas.microsoft.com/office/powerpoint/2010/main" val="3009958123"/>
+      </p:ext>
+    </p:extLst>
+  </p:cSld>
+  <p:clrMapOvr>
+    <a:masterClrMapping/>
+  </p:clrMapOvr>
+  <mc:AlternateContent xmlns:mc="http://schemas.openxmlformats.org/markup-compatibility/2006" xmlns:p14="http://schemas.microsoft.com/office/powerpoint/2010/main">
+    <mc:Choice Requires="p14">
+      <p:transition spd="slow" p14:dur="2000"/>
+    </mc:Choice>
+    <mc:Fallback xmlns="">
+      <p:transition spd="slow"/>
+    </mc:Fallback>
+  </mc:AlternateContent>
+  <p:timing>
+    <p:tnLst>
+      <p:par>
+        <p:cTn id="1" dur="indefinite" restart="never" nodeType="tmRoot"/>
+      </p:par>
+    </p:tnLst>
+  </p:timing>
+</p:sld>
+</file>
+
+<file path=ppt/slides/slide13.xml><?xml version="1.0" encoding="utf-8"?>
+<p:sld xmlns:a="http://schemas.openxmlformats.org/drawingml/2006/main" xmlns:r="http://schemas.openxmlformats.org/officeDocument/2006/relationships" xmlns:p="http://schemas.openxmlformats.org/presentationml/2006/main" show="0">
+  <p:cSld>
+    <p:spTree>
+      <p:nvGrpSpPr>
+        <p:cNvPr id="1" name=""/>
+        <p:cNvGrpSpPr/>
+        <p:nvPr/>
+      </p:nvGrpSpPr>
+      <p:grpSpPr>
+        <a:xfrm>
+          <a:off x="0" y="0"/>
+          <a:ext cx="0" cy="0"/>
+          <a:chOff x="0" y="0"/>
+          <a:chExt cx="0" cy="0"/>
+        </a:xfrm>
+      </p:grpSpPr>
+      <p:sp>
+        <p:nvSpPr>
           <p:cNvPr id="4" name="Footer Placeholder 3"/>
           <p:cNvSpPr>
             <a:spLocks noGrp="1"/>
@@ -6606,7 +6858,7 @@
           <a:p>
             <a:fld id="{AA986F54-24DE-4AB4-95BF-72E7F2EFFBC6}" type="slidenum">
               <a:rPr lang="en-US" smtClean="0"/>
-              <a:t>12</a:t>
+              <a:t>13</a:t>
             </a:fld>
             <a:endParaRPr lang="en-US" dirty="0"/>
           </a:p>
@@ -6661,11 +6913,11 @@
   <p:clrMapOvr>
     <a:masterClrMapping/>
   </p:clrMapOvr>
-  <mc:AlternateContent xmlns:mc="http://schemas.openxmlformats.org/markup-compatibility/2006">
-    <mc:Choice xmlns:p14="http://schemas.microsoft.com/office/powerpoint/2010/main" Requires="p14">
+  <mc:AlternateContent xmlns:mc="http://schemas.openxmlformats.org/markup-compatibility/2006" xmlns:p14="http://schemas.microsoft.com/office/powerpoint/2010/main">
+    <mc:Choice Requires="p14">
       <p:transition spd="slow" p14:dur="2000"/>
     </mc:Choice>
-    <mc:Fallback>
+    <mc:Fallback xmlns="">
       <p:transition spd="slow"/>
     </mc:Fallback>
   </mc:AlternateContent>
@@ -6780,29 +7032,6 @@
             <a:pPr marL="0" indent="0">
               <a:buNone/>
             </a:pPr>
-            <a:endParaRPr lang="en-US" dirty="0"/>
-          </a:p>
-        </p:txBody>
-      </p:sp>
-      <p:sp>
-        <p:nvSpPr>
-          <p:cNvPr id="4" name="Footer Placeholder 3"/>
-          <p:cNvSpPr>
-            <a:spLocks noGrp="1"/>
-          </p:cNvSpPr>
-          <p:nvPr>
-            <p:ph type="ftr" sz="quarter" idx="11"/>
-          </p:nvPr>
-        </p:nvSpPr>
-        <p:spPr/>
-        <p:txBody>
-          <a:bodyPr/>
-          <a:lstStyle/>
-          <a:p>
-            <a:r>
-              <a:rPr lang="en-US" smtClean="0"/>
-              <a:t>MVVM All around</a:t>
-            </a:r>
             <a:endParaRPr lang="en-US" dirty="0"/>
           </a:p>
         </p:txBody>
@@ -7133,29 +7362,6 @@
       </p:sp>
       <p:sp>
         <p:nvSpPr>
-          <p:cNvPr id="4" name="Footer Placeholder 3"/>
-          <p:cNvSpPr>
-            <a:spLocks noGrp="1"/>
-          </p:cNvSpPr>
-          <p:nvPr>
-            <p:ph type="ftr" sz="quarter" idx="11"/>
-          </p:nvPr>
-        </p:nvSpPr>
-        <p:spPr/>
-        <p:txBody>
-          <a:bodyPr/>
-          <a:lstStyle/>
-          <a:p>
-            <a:r>
-              <a:rPr lang="en-US" dirty="0" smtClean="0"/>
-              <a:t>MVVM All around</a:t>
-            </a:r>
-            <a:endParaRPr lang="en-US" dirty="0"/>
-          </a:p>
-        </p:txBody>
-      </p:sp>
-      <p:sp>
-        <p:nvSpPr>
           <p:cNvPr id="5" name="Slide Number Placeholder 4"/>
           <p:cNvSpPr>
             <a:spLocks noGrp="1"/>
@@ -7793,29 +7999,6 @@
           </a:p>
           <a:p>
             <a:endParaRPr lang="en-US" dirty="0" smtClean="0"/>
-          </a:p>
-        </p:txBody>
-      </p:sp>
-      <p:sp>
-        <p:nvSpPr>
-          <p:cNvPr id="4" name="Footer Placeholder 3"/>
-          <p:cNvSpPr>
-            <a:spLocks noGrp="1"/>
-          </p:cNvSpPr>
-          <p:nvPr>
-            <p:ph type="ftr" sz="quarter" idx="11"/>
-          </p:nvPr>
-        </p:nvSpPr>
-        <p:spPr/>
-        <p:txBody>
-          <a:bodyPr/>
-          <a:lstStyle/>
-          <a:p>
-            <a:r>
-              <a:rPr lang="en-US" smtClean="0"/>
-              <a:t>MVVM All around</a:t>
-            </a:r>
-            <a:endParaRPr lang="en-US" dirty="0"/>
           </a:p>
         </p:txBody>
       </p:sp>
@@ -8847,10 +9030,15 @@
             <p:ph idx="1"/>
           </p:nvPr>
         </p:nvSpPr>
-        <p:spPr/>
+        <p:spPr>
+          <a:xfrm>
+            <a:off x="457200" y="735547"/>
+            <a:ext cx="4258816" cy="3859076"/>
+          </a:xfrm>
+        </p:spPr>
         <p:txBody>
           <a:bodyPr>
-            <a:normAutofit fontScale="77500" lnSpcReduction="20000"/>
+            <a:noAutofit/>
           </a:bodyPr>
           <a:lstStyle/>
           <a:p>
@@ -8858,7 +9046,7 @@
               <a:buNone/>
             </a:pPr>
             <a:r>
-              <a:rPr lang="en-US" dirty="0">
+              <a:rPr lang="en-US" sz="2000" dirty="0">
                 <a:solidFill>
                   <a:schemeClr val="accent1"/>
                 </a:solidFill>
@@ -8867,13 +9055,13 @@
               <a:t>interface</a:t>
             </a:r>
             <a:r>
-              <a:rPr lang="en-US" dirty="0">
+              <a:rPr lang="en-US" sz="2000" dirty="0">
                 <a:cs typeface="Consolas" pitchFamily="49" charset="0"/>
               </a:rPr>
               <a:t> </a:t>
             </a:r>
             <a:r>
-              <a:rPr lang="en-US" dirty="0" err="1">
+              <a:rPr lang="en-US" sz="2000" dirty="0" err="1">
                 <a:solidFill>
                   <a:schemeClr val="accent1">
                     <a:lumMod val="50000"/>
@@ -8884,13 +9072,13 @@
               <a:t>IObservable</a:t>
             </a:r>
             <a:r>
-              <a:rPr lang="en-US" dirty="0">
+              <a:rPr lang="en-US" sz="2000" dirty="0">
                 <a:cs typeface="Consolas" pitchFamily="49" charset="0"/>
               </a:rPr>
               <a:t>&lt;</a:t>
             </a:r>
             <a:r>
-              <a:rPr lang="en-US" dirty="0">
+              <a:rPr lang="en-US" sz="2000" dirty="0">
                 <a:solidFill>
                   <a:schemeClr val="accent1"/>
                 </a:solidFill>
@@ -8899,7 +9087,7 @@
               <a:t>out</a:t>
             </a:r>
             <a:r>
-              <a:rPr lang="en-US" dirty="0">
+              <a:rPr lang="en-US" sz="2000" dirty="0">
                 <a:cs typeface="Consolas" pitchFamily="49" charset="0"/>
               </a:rPr>
               <a:t> T&gt;</a:t>
@@ -8910,7 +9098,7 @@
               <a:buNone/>
             </a:pPr>
             <a:r>
-              <a:rPr lang="en-US" dirty="0">
+              <a:rPr lang="en-US" sz="2000" dirty="0">
                 <a:cs typeface="Consolas" pitchFamily="49" charset="0"/>
               </a:rPr>
               <a:t>{</a:t>
@@ -8921,13 +9109,13 @@
               <a:buNone/>
             </a:pPr>
             <a:r>
-              <a:rPr lang="en-US" dirty="0">
+              <a:rPr lang="en-US" sz="2000" dirty="0">
                 <a:cs typeface="Consolas" pitchFamily="49" charset="0"/>
               </a:rPr>
               <a:t>    </a:t>
             </a:r>
             <a:r>
-              <a:rPr lang="en-US" dirty="0" err="1">
+              <a:rPr lang="en-US" sz="2000" dirty="0" err="1">
                 <a:solidFill>
                   <a:schemeClr val="accent1">
                     <a:lumMod val="50000"/>
@@ -8938,7 +9126,7 @@
               <a:t>IDisposable</a:t>
             </a:r>
             <a:r>
-              <a:rPr lang="en-US" dirty="0">
+              <a:rPr lang="en-US" sz="2000" dirty="0">
                 <a:solidFill>
                   <a:schemeClr val="accent1"/>
                 </a:solidFill>
@@ -8947,13 +9135,13 @@
               <a:t> </a:t>
             </a:r>
             <a:r>
-              <a:rPr lang="en-US" dirty="0">
+              <a:rPr lang="en-US" sz="2000" dirty="0">
                 <a:cs typeface="Consolas" pitchFamily="49" charset="0"/>
               </a:rPr>
               <a:t>Subscribe(</a:t>
             </a:r>
             <a:r>
-              <a:rPr lang="en-US" dirty="0" err="1">
+              <a:rPr lang="en-US" sz="2000" dirty="0" err="1">
                 <a:solidFill>
                   <a:schemeClr val="accent1">
                     <a:lumMod val="50000"/>
@@ -8964,18 +9152,18 @@
               <a:t>IObserver</a:t>
             </a:r>
             <a:r>
-              <a:rPr lang="en-US" dirty="0">
+              <a:rPr lang="en-US" sz="2000" dirty="0">
                 <a:cs typeface="Consolas" pitchFamily="49" charset="0"/>
               </a:rPr>
               <a:t>&lt;T&gt; observer);</a:t>
             </a:r>
             <a:br>
-              <a:rPr lang="en-US" dirty="0">
+              <a:rPr lang="en-US" sz="2000" dirty="0">
                 <a:cs typeface="Consolas" pitchFamily="49" charset="0"/>
               </a:rPr>
             </a:br>
             <a:r>
-              <a:rPr lang="en-US" dirty="0">
+              <a:rPr lang="en-US" sz="2000" dirty="0">
                 <a:cs typeface="Consolas" pitchFamily="49" charset="0"/>
               </a:rPr>
               <a:t>}</a:t>
@@ -8985,7 +9173,7 @@
             <a:pPr marL="0" indent="0">
               <a:buNone/>
             </a:pPr>
-            <a:endParaRPr lang="en-US" dirty="0">
+            <a:endParaRPr lang="en-US" sz="2000" dirty="0">
               <a:cs typeface="Consolas" pitchFamily="49" charset="0"/>
             </a:endParaRPr>
           </a:p>
@@ -8994,7 +9182,7 @@
               <a:buNone/>
             </a:pPr>
             <a:r>
-              <a:rPr lang="en-US" dirty="0">
+              <a:rPr lang="en-US" sz="2000" dirty="0">
                 <a:solidFill>
                   <a:schemeClr val="accent1"/>
                 </a:solidFill>
@@ -9003,7 +9191,7 @@
               <a:t>interface </a:t>
             </a:r>
             <a:r>
-              <a:rPr lang="en-US" dirty="0" err="1">
+              <a:rPr lang="en-US" sz="2000" dirty="0" err="1">
                 <a:solidFill>
                   <a:schemeClr val="accent1">
                     <a:lumMod val="50000"/>
@@ -9014,13 +9202,13 @@
               <a:t>IObserver</a:t>
             </a:r>
             <a:r>
-              <a:rPr lang="en-US" dirty="0">
+              <a:rPr lang="en-US" sz="2000" dirty="0">
                 <a:cs typeface="Consolas" pitchFamily="49" charset="0"/>
               </a:rPr>
               <a:t>&lt;</a:t>
             </a:r>
             <a:r>
-              <a:rPr lang="en-US" dirty="0">
+              <a:rPr lang="en-US" sz="2000" dirty="0">
                 <a:solidFill>
                   <a:schemeClr val="accent1"/>
                 </a:solidFill>
@@ -9029,12 +9217,12 @@
               <a:t>in </a:t>
             </a:r>
             <a:r>
-              <a:rPr lang="en-US" dirty="0">
+              <a:rPr lang="en-US" sz="2000" dirty="0">
                 <a:cs typeface="Consolas" pitchFamily="49" charset="0"/>
               </a:rPr>
               <a:t>T&gt;</a:t>
             </a:r>
-            <a:endParaRPr lang="en-US" dirty="0">
+            <a:endParaRPr lang="en-US" sz="2000" dirty="0">
               <a:solidFill>
                 <a:schemeClr val="accent1">
                   <a:lumMod val="50000"/>
@@ -9048,7 +9236,7 @@
               <a:buNone/>
             </a:pPr>
             <a:r>
-              <a:rPr lang="en-US" dirty="0">
+              <a:rPr lang="en-US" sz="2000" dirty="0">
                 <a:cs typeface="Consolas" pitchFamily="49" charset="0"/>
               </a:rPr>
               <a:t>{</a:t>
@@ -9059,13 +9247,13 @@
               <a:buNone/>
             </a:pPr>
             <a:r>
-              <a:rPr lang="en-US" dirty="0">
+              <a:rPr lang="en-US" sz="2000" dirty="0">
                 <a:cs typeface="Consolas" pitchFamily="49" charset="0"/>
               </a:rPr>
               <a:t>    </a:t>
             </a:r>
             <a:r>
-              <a:rPr lang="en-US" dirty="0">
+              <a:rPr lang="en-US" sz="2000" dirty="0">
                 <a:solidFill>
                   <a:schemeClr val="accent1"/>
                 </a:solidFill>
@@ -9074,19 +9262,19 @@
               <a:t>void</a:t>
             </a:r>
             <a:r>
-              <a:rPr lang="en-US" dirty="0">
+              <a:rPr lang="en-US" sz="2000" dirty="0">
                 <a:cs typeface="Consolas" pitchFamily="49" charset="0"/>
               </a:rPr>
               <a:t>   </a:t>
             </a:r>
             <a:r>
-              <a:rPr lang="en-US" dirty="0" err="1">
+              <a:rPr lang="en-US" sz="2000" dirty="0" err="1">
                 <a:cs typeface="Consolas" pitchFamily="49" charset="0"/>
               </a:rPr>
               <a:t>OnNext</a:t>
             </a:r>
             <a:r>
-              <a:rPr lang="en-US" dirty="0">
+              <a:rPr lang="en-US" sz="2000" dirty="0">
                 <a:cs typeface="Consolas" pitchFamily="49" charset="0"/>
               </a:rPr>
               <a:t>(T value);</a:t>
@@ -9097,7 +9285,7 @@
               <a:buNone/>
             </a:pPr>
             <a:r>
-              <a:rPr lang="en-US" dirty="0">
+              <a:rPr lang="en-US" sz="2000" dirty="0">
                 <a:solidFill>
                   <a:schemeClr val="accent1"/>
                 </a:solidFill>
@@ -9106,25 +9294,25 @@
               <a:t>    void</a:t>
             </a:r>
             <a:r>
-              <a:rPr lang="en-US" dirty="0">
+              <a:rPr lang="en-US" sz="2000" dirty="0">
                 <a:cs typeface="Consolas" pitchFamily="49" charset="0"/>
               </a:rPr>
               <a:t>   </a:t>
             </a:r>
             <a:r>
-              <a:rPr lang="en-US" dirty="0" err="1">
+              <a:rPr lang="en-US" sz="2000" dirty="0" err="1">
                 <a:cs typeface="Consolas" pitchFamily="49" charset="0"/>
               </a:rPr>
               <a:t>OnError</a:t>
             </a:r>
             <a:r>
-              <a:rPr lang="en-US" dirty="0">
+              <a:rPr lang="en-US" sz="2000" dirty="0">
                 <a:cs typeface="Consolas" pitchFamily="49" charset="0"/>
               </a:rPr>
               <a:t>(</a:t>
             </a:r>
             <a:r>
-              <a:rPr lang="en-US" dirty="0">
+              <a:rPr lang="en-US" sz="2000" dirty="0">
                 <a:solidFill>
                   <a:schemeClr val="accent1">
                     <a:lumMod val="50000"/>
@@ -9135,7 +9323,7 @@
               <a:t>Exception</a:t>
             </a:r>
             <a:r>
-              <a:rPr lang="en-US" dirty="0">
+              <a:rPr lang="en-US" sz="2000" dirty="0">
                 <a:cs typeface="Consolas" pitchFamily="49" charset="0"/>
               </a:rPr>
               <a:t> ex);</a:t>
@@ -9146,13 +9334,13 @@
               <a:buNone/>
             </a:pPr>
             <a:r>
-              <a:rPr lang="en-US" dirty="0">
+              <a:rPr lang="en-US" sz="2000" dirty="0">
                 <a:cs typeface="Consolas" pitchFamily="49" charset="0"/>
               </a:rPr>
               <a:t>    </a:t>
             </a:r>
             <a:r>
-              <a:rPr lang="en-US" dirty="0">
+              <a:rPr lang="en-US" sz="2000" dirty="0">
                 <a:solidFill>
                   <a:schemeClr val="accent1"/>
                 </a:solidFill>
@@ -9161,19 +9349,19 @@
               <a:t>void</a:t>
             </a:r>
             <a:r>
-              <a:rPr lang="en-US" dirty="0">
+              <a:rPr lang="en-US" sz="2000" dirty="0">
                 <a:cs typeface="Consolas" pitchFamily="49" charset="0"/>
               </a:rPr>
               <a:t>   </a:t>
             </a:r>
             <a:r>
-              <a:rPr lang="en-US" dirty="0" err="1">
+              <a:rPr lang="en-US" sz="2000" dirty="0" err="1">
                 <a:cs typeface="Consolas" pitchFamily="49" charset="0"/>
               </a:rPr>
               <a:t>OnCompleted</a:t>
             </a:r>
             <a:r>
-              <a:rPr lang="en-US" dirty="0">
+              <a:rPr lang="en-US" sz="2000" dirty="0">
                 <a:cs typeface="Consolas" pitchFamily="49" charset="0"/>
               </a:rPr>
               <a:t>();</a:t>
@@ -9184,37 +9372,17 @@
               <a:buNone/>
             </a:pPr>
             <a:r>
-              <a:rPr lang="en-US" dirty="0">
+              <a:rPr lang="en-US" sz="2000" dirty="0">
                 <a:cs typeface="Consolas" pitchFamily="49" charset="0"/>
               </a:rPr>
               <a:t>}</a:t>
             </a:r>
-          </a:p>
-          <a:p>
-            <a:endParaRPr lang="en-US" dirty="0"/>
-          </a:p>
-        </p:txBody>
-      </p:sp>
-      <p:sp>
-        <p:nvSpPr>
-          <p:cNvPr id="4" name="Footer Placeholder 3"/>
-          <p:cNvSpPr>
-            <a:spLocks noGrp="1"/>
-          </p:cNvSpPr>
-          <p:nvPr>
-            <p:ph type="ftr" sz="quarter" idx="11"/>
-          </p:nvPr>
-        </p:nvSpPr>
-        <p:spPr/>
-        <p:txBody>
-          <a:bodyPr/>
-          <a:lstStyle/>
-          <a:p>
-            <a:r>
-              <a:rPr lang="en-US" smtClean="0"/>
-              <a:t>MVVM All around</a:t>
-            </a:r>
-            <a:endParaRPr lang="en-US" dirty="0"/>
+            <a:endParaRPr lang="en-US" sz="3600" dirty="0">
+              <a:cs typeface="Consolas" pitchFamily="49" charset="0"/>
+            </a:endParaRPr>
+          </a:p>
+          <a:p>
+            <a:endParaRPr lang="en-US" sz="3600" dirty="0"/>
           </a:p>
         </p:txBody>
       </p:sp>
@@ -9238,6 +9406,486 @@
               <a:t>6</a:t>
             </a:fld>
             <a:endParaRPr lang="en-US"/>
+          </a:p>
+        </p:txBody>
+      </p:sp>
+      <p:sp>
+        <p:nvSpPr>
+          <p:cNvPr id="6" name="Content Placeholder 2"/>
+          <p:cNvSpPr txBox="1">
+            <a:spLocks/>
+          </p:cNvSpPr>
+          <p:nvPr/>
+        </p:nvSpPr>
+        <p:spPr>
+          <a:xfrm>
+            <a:off x="4850100" y="771550"/>
+            <a:ext cx="4258816" cy="3859076"/>
+          </a:xfrm>
+          <a:prstGeom prst="rect">
+            <a:avLst/>
+          </a:prstGeom>
+        </p:spPr>
+        <p:txBody>
+          <a:bodyPr vert="horz" lIns="91440" tIns="45720" rIns="91440" bIns="45720" rtlCol="0">
+            <a:noAutofit/>
+          </a:bodyPr>
+          <a:lstStyle>
+            <a:lvl1pPr marL="342900" indent="-342900" algn="l" defTabSz="914400" rtl="0" eaLnBrk="1" latinLnBrk="0" hangingPunct="1">
+              <a:spcBef>
+                <a:spcPct val="20000"/>
+              </a:spcBef>
+              <a:buFont typeface="Arial" pitchFamily="34" charset="0"/>
+              <a:buChar char="•"/>
+              <a:defRPr sz="2800" kern="1200">
+                <a:solidFill>
+                  <a:schemeClr val="tx1"/>
+                </a:solidFill>
+                <a:latin typeface="+mn-lt"/>
+                <a:ea typeface="+mn-ea"/>
+                <a:cs typeface="+mn-cs"/>
+              </a:defRPr>
+            </a:lvl1pPr>
+            <a:lvl2pPr marL="742950" indent="-285750" algn="l" defTabSz="914400" rtl="0" eaLnBrk="1" latinLnBrk="0" hangingPunct="1">
+              <a:spcBef>
+                <a:spcPct val="20000"/>
+              </a:spcBef>
+              <a:buFont typeface="Arial" pitchFamily="34" charset="0"/>
+              <a:buChar char="–"/>
+              <a:defRPr sz="2400" kern="1200">
+                <a:solidFill>
+                  <a:schemeClr val="tx1"/>
+                </a:solidFill>
+                <a:latin typeface="+mn-lt"/>
+                <a:ea typeface="+mn-ea"/>
+                <a:cs typeface="+mn-cs"/>
+              </a:defRPr>
+            </a:lvl2pPr>
+            <a:lvl3pPr marL="1143000" indent="-228600" algn="l" defTabSz="914400" rtl="0" eaLnBrk="1" latinLnBrk="0" hangingPunct="1">
+              <a:spcBef>
+                <a:spcPct val="20000"/>
+              </a:spcBef>
+              <a:buFont typeface="Arial" pitchFamily="34" charset="0"/>
+              <a:buChar char="•"/>
+              <a:defRPr sz="2000" kern="1200">
+                <a:solidFill>
+                  <a:schemeClr val="tx1"/>
+                </a:solidFill>
+                <a:latin typeface="+mn-lt"/>
+                <a:ea typeface="+mn-ea"/>
+                <a:cs typeface="+mn-cs"/>
+              </a:defRPr>
+            </a:lvl3pPr>
+            <a:lvl4pPr marL="1600200" indent="-228600" algn="l" defTabSz="914400" rtl="0" eaLnBrk="1" latinLnBrk="0" hangingPunct="1">
+              <a:spcBef>
+                <a:spcPct val="20000"/>
+              </a:spcBef>
+              <a:buFont typeface="Arial" pitchFamily="34" charset="0"/>
+              <a:buChar char="–"/>
+              <a:defRPr sz="1800" kern="1200">
+                <a:solidFill>
+                  <a:schemeClr val="tx1"/>
+                </a:solidFill>
+                <a:latin typeface="+mn-lt"/>
+                <a:ea typeface="+mn-ea"/>
+                <a:cs typeface="+mn-cs"/>
+              </a:defRPr>
+            </a:lvl4pPr>
+            <a:lvl5pPr marL="2057400" indent="-228600" algn="l" defTabSz="914400" rtl="0" eaLnBrk="1" latinLnBrk="0" hangingPunct="1">
+              <a:spcBef>
+                <a:spcPct val="20000"/>
+              </a:spcBef>
+              <a:buFont typeface="Arial" pitchFamily="34" charset="0"/>
+              <a:buChar char="»"/>
+              <a:defRPr sz="1800" kern="1200">
+                <a:solidFill>
+                  <a:schemeClr val="tx1"/>
+                </a:solidFill>
+                <a:latin typeface="+mn-lt"/>
+                <a:ea typeface="+mn-ea"/>
+                <a:cs typeface="+mn-cs"/>
+              </a:defRPr>
+            </a:lvl5pPr>
+            <a:lvl6pPr marL="2514600" indent="-228600" algn="l" defTabSz="914400" rtl="0" eaLnBrk="1" latinLnBrk="0" hangingPunct="1">
+              <a:spcBef>
+                <a:spcPct val="20000"/>
+              </a:spcBef>
+              <a:buFont typeface="Arial" pitchFamily="34" charset="0"/>
+              <a:buChar char="•"/>
+              <a:defRPr sz="2000" kern="1200">
+                <a:solidFill>
+                  <a:schemeClr val="tx1"/>
+                </a:solidFill>
+                <a:latin typeface="+mn-lt"/>
+                <a:ea typeface="+mn-ea"/>
+                <a:cs typeface="+mn-cs"/>
+              </a:defRPr>
+            </a:lvl6pPr>
+            <a:lvl7pPr marL="2971800" indent="-228600" algn="l" defTabSz="914400" rtl="0" eaLnBrk="1" latinLnBrk="0" hangingPunct="1">
+              <a:spcBef>
+                <a:spcPct val="20000"/>
+              </a:spcBef>
+              <a:buFont typeface="Arial" pitchFamily="34" charset="0"/>
+              <a:buChar char="•"/>
+              <a:defRPr sz="2000" kern="1200">
+                <a:solidFill>
+                  <a:schemeClr val="tx1"/>
+                </a:solidFill>
+                <a:latin typeface="+mn-lt"/>
+                <a:ea typeface="+mn-ea"/>
+                <a:cs typeface="+mn-cs"/>
+              </a:defRPr>
+            </a:lvl7pPr>
+            <a:lvl8pPr marL="3429000" indent="-228600" algn="l" defTabSz="914400" rtl="0" eaLnBrk="1" latinLnBrk="0" hangingPunct="1">
+              <a:spcBef>
+                <a:spcPct val="20000"/>
+              </a:spcBef>
+              <a:buFont typeface="Arial" pitchFamily="34" charset="0"/>
+              <a:buChar char="•"/>
+              <a:defRPr sz="2000" kern="1200">
+                <a:solidFill>
+                  <a:schemeClr val="tx1"/>
+                </a:solidFill>
+                <a:latin typeface="+mn-lt"/>
+                <a:ea typeface="+mn-ea"/>
+                <a:cs typeface="+mn-cs"/>
+              </a:defRPr>
+            </a:lvl8pPr>
+            <a:lvl9pPr marL="3886200" indent="-228600" algn="l" defTabSz="914400" rtl="0" eaLnBrk="1" latinLnBrk="0" hangingPunct="1">
+              <a:spcBef>
+                <a:spcPct val="20000"/>
+              </a:spcBef>
+              <a:buFont typeface="Arial" pitchFamily="34" charset="0"/>
+              <a:buChar char="•"/>
+              <a:defRPr sz="2000" kern="1200">
+                <a:solidFill>
+                  <a:schemeClr val="tx1"/>
+                </a:solidFill>
+                <a:latin typeface="+mn-lt"/>
+                <a:ea typeface="+mn-ea"/>
+                <a:cs typeface="+mn-cs"/>
+              </a:defRPr>
+            </a:lvl9pPr>
+          </a:lstStyle>
+          <a:p>
+            <a:pPr marL="0" indent="0">
+              <a:buNone/>
+            </a:pPr>
+            <a:r>
+              <a:rPr lang="en-US" sz="2000" dirty="0">
+                <a:solidFill>
+                  <a:schemeClr val="accent1"/>
+                </a:solidFill>
+                <a:cs typeface="Consolas" pitchFamily="49" charset="0"/>
+              </a:rPr>
+              <a:t>interface</a:t>
+            </a:r>
+            <a:r>
+              <a:rPr lang="en-US" sz="2000" dirty="0">
+                <a:cs typeface="Consolas" pitchFamily="49" charset="0"/>
+              </a:rPr>
+              <a:t> </a:t>
+            </a:r>
+            <a:r>
+              <a:rPr lang="en-US" sz="2000" dirty="0" err="1">
+                <a:solidFill>
+                  <a:schemeClr val="accent1">
+                    <a:lumMod val="50000"/>
+                  </a:schemeClr>
+                </a:solidFill>
+                <a:cs typeface="Consolas" pitchFamily="49" charset="0"/>
+              </a:rPr>
+              <a:t>IEnumerable</a:t>
+            </a:r>
+            <a:r>
+              <a:rPr lang="en-US" sz="2000" dirty="0">
+                <a:cs typeface="Consolas" pitchFamily="49" charset="0"/>
+              </a:rPr>
+              <a:t>&lt;</a:t>
+            </a:r>
+            <a:r>
+              <a:rPr lang="en-US" sz="2000" dirty="0">
+                <a:solidFill>
+                  <a:schemeClr val="accent1"/>
+                </a:solidFill>
+                <a:cs typeface="Consolas" pitchFamily="49" charset="0"/>
+              </a:rPr>
+              <a:t>out </a:t>
+            </a:r>
+            <a:r>
+              <a:rPr lang="en-US" sz="2000" dirty="0">
+                <a:cs typeface="Consolas" pitchFamily="49" charset="0"/>
+              </a:rPr>
+              <a:t>T&gt;</a:t>
+            </a:r>
+          </a:p>
+          <a:p>
+            <a:pPr marL="0" indent="0">
+              <a:buNone/>
+            </a:pPr>
+            <a:r>
+              <a:rPr lang="en-US" sz="2000" dirty="0">
+                <a:cs typeface="Consolas" pitchFamily="49" charset="0"/>
+              </a:rPr>
+              <a:t>{</a:t>
+            </a:r>
+          </a:p>
+          <a:p>
+            <a:pPr marL="0" indent="0">
+              <a:buNone/>
+            </a:pPr>
+            <a:r>
+              <a:rPr lang="en-US" sz="2000" dirty="0">
+                <a:cs typeface="Consolas" pitchFamily="49" charset="0"/>
+              </a:rPr>
+              <a:t>    </a:t>
+            </a:r>
+            <a:r>
+              <a:rPr lang="en-US" sz="2000" dirty="0" err="1">
+                <a:solidFill>
+                  <a:schemeClr val="accent1">
+                    <a:lumMod val="50000"/>
+                  </a:schemeClr>
+                </a:solidFill>
+                <a:cs typeface="Consolas" pitchFamily="49" charset="0"/>
+              </a:rPr>
+              <a:t>IEnumerator</a:t>
+            </a:r>
+            <a:r>
+              <a:rPr lang="en-US" sz="2000" dirty="0">
+                <a:cs typeface="Consolas" pitchFamily="49" charset="0"/>
+              </a:rPr>
+              <a:t>&lt;T&gt; </a:t>
+            </a:r>
+            <a:r>
+              <a:rPr lang="en-US" sz="2000" b="1" dirty="0" err="1">
+                <a:solidFill>
+                  <a:schemeClr val="accent3"/>
+                </a:solidFill>
+                <a:cs typeface="Consolas" pitchFamily="49" charset="0"/>
+              </a:rPr>
+              <a:t>Get</a:t>
+            </a:r>
+            <a:r>
+              <a:rPr lang="en-US" sz="2000" dirty="0" err="1">
+                <a:cs typeface="Consolas" pitchFamily="49" charset="0"/>
+              </a:rPr>
+              <a:t>Enumerator</a:t>
+            </a:r>
+            <a:r>
+              <a:rPr lang="en-US" sz="2000" dirty="0">
+                <a:cs typeface="Consolas" pitchFamily="49" charset="0"/>
+              </a:rPr>
+              <a:t>();</a:t>
+            </a:r>
+            <a:br>
+              <a:rPr lang="en-US" sz="2000" dirty="0">
+                <a:cs typeface="Consolas" pitchFamily="49" charset="0"/>
+              </a:rPr>
+            </a:br>
+            <a:r>
+              <a:rPr lang="en-US" sz="2000" dirty="0">
+                <a:cs typeface="Consolas" pitchFamily="49" charset="0"/>
+              </a:rPr>
+              <a:t>}</a:t>
+            </a:r>
+          </a:p>
+          <a:p>
+            <a:pPr marL="0" indent="0">
+              <a:buNone/>
+            </a:pPr>
+            <a:endParaRPr lang="en-US" sz="2000" dirty="0">
+              <a:cs typeface="Consolas" pitchFamily="49" charset="0"/>
+            </a:endParaRPr>
+          </a:p>
+          <a:p>
+            <a:pPr marL="0" indent="0">
+              <a:buNone/>
+            </a:pPr>
+            <a:r>
+              <a:rPr lang="en-US" sz="2000" dirty="0">
+                <a:solidFill>
+                  <a:schemeClr val="accent1"/>
+                </a:solidFill>
+                <a:cs typeface="Consolas" pitchFamily="49" charset="0"/>
+              </a:rPr>
+              <a:t>interface </a:t>
+            </a:r>
+            <a:r>
+              <a:rPr lang="en-US" sz="2000" dirty="0" err="1">
+                <a:solidFill>
+                  <a:schemeClr val="accent1">
+                    <a:lumMod val="50000"/>
+                  </a:schemeClr>
+                </a:solidFill>
+                <a:cs typeface="Consolas" pitchFamily="49" charset="0"/>
+              </a:rPr>
+              <a:t>IEnumerator</a:t>
+            </a:r>
+            <a:r>
+              <a:rPr lang="en-US" sz="2000" dirty="0">
+                <a:cs typeface="Consolas" pitchFamily="49" charset="0"/>
+              </a:rPr>
+              <a:t>&lt;</a:t>
+            </a:r>
+            <a:r>
+              <a:rPr lang="en-US" sz="2000" dirty="0">
+                <a:solidFill>
+                  <a:schemeClr val="accent1"/>
+                </a:solidFill>
+                <a:cs typeface="Consolas" pitchFamily="49" charset="0"/>
+              </a:rPr>
+              <a:t>out</a:t>
+            </a:r>
+            <a:r>
+              <a:rPr lang="en-US" sz="2000" dirty="0">
+                <a:cs typeface="Consolas" pitchFamily="49" charset="0"/>
+              </a:rPr>
+              <a:t> T&gt; : </a:t>
+            </a:r>
+            <a:r>
+              <a:rPr lang="en-US" sz="2000" dirty="0" err="1">
+                <a:solidFill>
+                  <a:schemeClr val="accent1">
+                    <a:lumMod val="50000"/>
+                  </a:schemeClr>
+                </a:solidFill>
+                <a:cs typeface="Consolas" pitchFamily="49" charset="0"/>
+              </a:rPr>
+              <a:t>IDisposable</a:t>
+            </a:r>
+            <a:endParaRPr lang="en-US" sz="2000" dirty="0">
+              <a:solidFill>
+                <a:schemeClr val="accent1">
+                  <a:lumMod val="50000"/>
+                </a:schemeClr>
+              </a:solidFill>
+              <a:cs typeface="Consolas" pitchFamily="49" charset="0"/>
+            </a:endParaRPr>
+          </a:p>
+          <a:p>
+            <a:pPr marL="0" indent="0">
+              <a:buNone/>
+            </a:pPr>
+            <a:r>
+              <a:rPr lang="en-US" sz="2000" dirty="0">
+                <a:cs typeface="Consolas" pitchFamily="49" charset="0"/>
+              </a:rPr>
+              <a:t>{</a:t>
+            </a:r>
+          </a:p>
+          <a:p>
+            <a:pPr marL="0" indent="0">
+              <a:buNone/>
+            </a:pPr>
+            <a:r>
+              <a:rPr lang="en-US" sz="2000" dirty="0">
+                <a:cs typeface="Consolas" pitchFamily="49" charset="0"/>
+              </a:rPr>
+              <a:t>    </a:t>
+            </a:r>
+            <a:r>
+              <a:rPr lang="en-US" sz="2000" dirty="0" err="1">
+                <a:solidFill>
+                  <a:schemeClr val="accent1"/>
+                </a:solidFill>
+                <a:cs typeface="Consolas" pitchFamily="49" charset="0"/>
+              </a:rPr>
+              <a:t>bool</a:t>
+            </a:r>
+            <a:r>
+              <a:rPr lang="en-US" sz="2000" dirty="0">
+                <a:cs typeface="Consolas" pitchFamily="49" charset="0"/>
+              </a:rPr>
+              <a:t>   </a:t>
+            </a:r>
+            <a:r>
+              <a:rPr lang="en-US" sz="2000" b="1" dirty="0" err="1">
+                <a:solidFill>
+                  <a:schemeClr val="accent3"/>
+                </a:solidFill>
+                <a:cs typeface="Consolas" pitchFamily="49" charset="0"/>
+              </a:rPr>
+              <a:t>Move</a:t>
+            </a:r>
+            <a:r>
+              <a:rPr lang="en-US" sz="2000" dirty="0" err="1">
+                <a:cs typeface="Consolas" pitchFamily="49" charset="0"/>
+              </a:rPr>
+              <a:t>Next</a:t>
+            </a:r>
+            <a:r>
+              <a:rPr lang="en-US" sz="2000" dirty="0">
+                <a:cs typeface="Consolas" pitchFamily="49" charset="0"/>
+              </a:rPr>
+              <a:t>();</a:t>
+            </a:r>
+          </a:p>
+          <a:p>
+            <a:pPr marL="0" indent="0">
+              <a:buNone/>
+            </a:pPr>
+            <a:r>
+              <a:rPr lang="en-US" sz="2000" dirty="0">
+                <a:cs typeface="Consolas" pitchFamily="49" charset="0"/>
+              </a:rPr>
+              <a:t>    T      Current { </a:t>
+            </a:r>
+            <a:r>
+              <a:rPr lang="en-US" sz="2000" dirty="0">
+                <a:solidFill>
+                  <a:schemeClr val="accent1"/>
+                </a:solidFill>
+                <a:cs typeface="Consolas" pitchFamily="49" charset="0"/>
+              </a:rPr>
+              <a:t>get</a:t>
+            </a:r>
+            <a:r>
+              <a:rPr lang="en-US" sz="2000" dirty="0">
+                <a:cs typeface="Consolas" pitchFamily="49" charset="0"/>
+              </a:rPr>
+              <a:t>; }</a:t>
+            </a:r>
+          </a:p>
+          <a:p>
+            <a:pPr marL="0" indent="0">
+              <a:buNone/>
+            </a:pPr>
+            <a:r>
+              <a:rPr lang="en-US" sz="2000" dirty="0">
+                <a:cs typeface="Consolas" pitchFamily="49" charset="0"/>
+              </a:rPr>
+              <a:t>    </a:t>
+            </a:r>
+            <a:r>
+              <a:rPr lang="en-US" sz="2000" dirty="0">
+                <a:solidFill>
+                  <a:schemeClr val="accent1"/>
+                </a:solidFill>
+                <a:cs typeface="Consolas" pitchFamily="49" charset="0"/>
+              </a:rPr>
+              <a:t>void</a:t>
+            </a:r>
+            <a:r>
+              <a:rPr lang="en-US" sz="2000" dirty="0">
+                <a:cs typeface="Consolas" pitchFamily="49" charset="0"/>
+              </a:rPr>
+              <a:t>   Reset();</a:t>
+            </a:r>
+          </a:p>
+          <a:p>
+            <a:pPr marL="0" indent="0">
+              <a:buNone/>
+            </a:pPr>
+            <a:r>
+              <a:rPr lang="en-US" sz="2000" dirty="0">
+                <a:cs typeface="Consolas" pitchFamily="49" charset="0"/>
+              </a:rPr>
+              <a:t>}</a:t>
+            </a:r>
+            <a:endParaRPr lang="en-US" sz="2000" dirty="0">
+              <a:cs typeface="Consolas" pitchFamily="49" charset="0"/>
+            </a:endParaRPr>
           </a:p>
         </p:txBody>
       </p:sp>
@@ -11146,11 +11794,7 @@
           <a:p>
             <a:r>
               <a:rPr lang="en-US" dirty="0" smtClean="0"/>
-              <a:t>And finally… Reactive </a:t>
-            </a:r>
-            <a:r>
-              <a:rPr lang="en-US" dirty="0" smtClean="0"/>
-              <a:t>UI</a:t>
+              <a:t>And finally… Reactive UI</a:t>
             </a:r>
             <a:endParaRPr lang="en-US" dirty="0"/>
           </a:p>
@@ -11181,38 +11825,11 @@
             </a:r>
             <a:r>
               <a:rPr lang="en-US" dirty="0" smtClean="0"/>
-              <a:t> goodness of </a:t>
-            </a:r>
-            <a:r>
-              <a:rPr lang="en-US" dirty="0" smtClean="0"/>
-              <a:t>Rx to the MVVM scene.</a:t>
+              <a:t> goodness of Rx to the MVVM scene.</a:t>
             </a:r>
           </a:p>
           <a:p>
             <a:endParaRPr lang="en-US" dirty="0" smtClean="0"/>
-          </a:p>
-        </p:txBody>
-      </p:sp>
-      <p:sp>
-        <p:nvSpPr>
-          <p:cNvPr id="4" name="Footer Placeholder 3"/>
-          <p:cNvSpPr>
-            <a:spLocks noGrp="1"/>
-          </p:cNvSpPr>
-          <p:nvPr>
-            <p:ph type="ftr" sz="quarter" idx="11"/>
-          </p:nvPr>
-        </p:nvSpPr>
-        <p:spPr/>
-        <p:txBody>
-          <a:bodyPr/>
-          <a:lstStyle/>
-          <a:p>
-            <a:r>
-              <a:rPr lang="en-US" smtClean="0"/>
-              <a:t>MVVM All around</a:t>
-            </a:r>
-            <a:endParaRPr lang="en-US" dirty="0"/>
           </a:p>
         </p:txBody>
       </p:sp>

</xml_diff>